<commit_message>
add chinese version of arxiv
</commit_message>
<xml_diff>
--- a/figures/figure_sample.pptx
+++ b/figures/figure_sample.pptx
@@ -5,12 +5,12 @@
     <p:sldMasterId id="2147483648" r:id="rId1"/>
   </p:sldMasterIdLst>
   <p:sldIdLst>
-    <p:sldId id="256" r:id="rId3"/>
+    <p:sldId id="256" r:id="rId2"/>
   </p:sldIdLst>
   <p:sldSz cx="12192000" cy="3527425"/>
   <p:notesSz cx="6858000" cy="9144000"/>
   <p:custDataLst>
-    <p:tags r:id="rId7"/>
+    <p:tags r:id="rId3"/>
   </p:custDataLst>
   <p:defaultTextStyle>
     <a:defPPr>
@@ -257,6 +257,7 @@
           <a:p>
             <a:fld id="{32DA9CA3-1682-4D49-BD84-33DE32D3C0F7}" type="datetimeFigureOut">
               <a:rPr lang="en-US" smtClean="0"/>
+              <a:t>8/17/23</a:t>
             </a:fld>
             <a:endParaRPr lang="en-US"/>
           </a:p>
@@ -298,6 +299,7 @@
           <a:p>
             <a:fld id="{56040734-3020-B24F-9D43-20822771C920}" type="slidenum">
               <a:rPr lang="en-US" smtClean="0"/>
+              <a:t>‹#›</a:t>
             </a:fld>
             <a:endParaRPr lang="en-US"/>
           </a:p>
@@ -371,7 +373,6 @@
               <a:rPr lang="en-US"/>
               <a:t>Click to edit Master text styles</a:t>
             </a:r>
-            <a:endParaRPr lang="en-US"/>
           </a:p>
           <a:p>
             <a:pPr lvl="1"/>
@@ -379,7 +380,6 @@
               <a:rPr lang="en-US"/>
               <a:t>Second level</a:t>
             </a:r>
-            <a:endParaRPr lang="en-US"/>
           </a:p>
           <a:p>
             <a:pPr lvl="2"/>
@@ -387,7 +387,6 @@
               <a:rPr lang="en-US"/>
               <a:t>Third level</a:t>
             </a:r>
-            <a:endParaRPr lang="en-US"/>
           </a:p>
           <a:p>
             <a:pPr lvl="3"/>
@@ -395,7 +394,6 @@
               <a:rPr lang="en-US"/>
               <a:t>Fourth level</a:t>
             </a:r>
-            <a:endParaRPr lang="en-US"/>
           </a:p>
           <a:p>
             <a:pPr lvl="4"/>
@@ -424,6 +422,7 @@
           <a:p>
             <a:fld id="{32DA9CA3-1682-4D49-BD84-33DE32D3C0F7}" type="datetimeFigureOut">
               <a:rPr lang="en-US" smtClean="0"/>
+              <a:t>8/17/23</a:t>
             </a:fld>
             <a:endParaRPr lang="en-US"/>
           </a:p>
@@ -465,6 +464,7 @@
           <a:p>
             <a:fld id="{56040734-3020-B24F-9D43-20822771C920}" type="slidenum">
               <a:rPr lang="en-US" smtClean="0"/>
+              <a:t>‹#›</a:t>
             </a:fld>
             <a:endParaRPr lang="en-US"/>
           </a:p>
@@ -548,7 +548,6 @@
               <a:rPr lang="en-US"/>
               <a:t>Click to edit Master text styles</a:t>
             </a:r>
-            <a:endParaRPr lang="en-US"/>
           </a:p>
           <a:p>
             <a:pPr lvl="1"/>
@@ -556,7 +555,6 @@
               <a:rPr lang="en-US"/>
               <a:t>Second level</a:t>
             </a:r>
-            <a:endParaRPr lang="en-US"/>
           </a:p>
           <a:p>
             <a:pPr lvl="2"/>
@@ -564,7 +562,6 @@
               <a:rPr lang="en-US"/>
               <a:t>Third level</a:t>
             </a:r>
-            <a:endParaRPr lang="en-US"/>
           </a:p>
           <a:p>
             <a:pPr lvl="3"/>
@@ -572,7 +569,6 @@
               <a:rPr lang="en-US"/>
               <a:t>Fourth level</a:t>
             </a:r>
-            <a:endParaRPr lang="en-US"/>
           </a:p>
           <a:p>
             <a:pPr lvl="4"/>
@@ -601,6 +597,7 @@
           <a:p>
             <a:fld id="{32DA9CA3-1682-4D49-BD84-33DE32D3C0F7}" type="datetimeFigureOut">
               <a:rPr lang="en-US" smtClean="0"/>
+              <a:t>8/17/23</a:t>
             </a:fld>
             <a:endParaRPr lang="en-US"/>
           </a:p>
@@ -642,6 +639,7 @@
           <a:p>
             <a:fld id="{56040734-3020-B24F-9D43-20822771C920}" type="slidenum">
               <a:rPr lang="en-US" smtClean="0"/>
+              <a:t>‹#›</a:t>
             </a:fld>
             <a:endParaRPr lang="en-US"/>
           </a:p>
@@ -715,7 +713,6 @@
               <a:rPr lang="en-US"/>
               <a:t>Click to edit Master text styles</a:t>
             </a:r>
-            <a:endParaRPr lang="en-US"/>
           </a:p>
           <a:p>
             <a:pPr lvl="1"/>
@@ -723,7 +720,6 @@
               <a:rPr lang="en-US"/>
               <a:t>Second level</a:t>
             </a:r>
-            <a:endParaRPr lang="en-US"/>
           </a:p>
           <a:p>
             <a:pPr lvl="2"/>
@@ -731,7 +727,6 @@
               <a:rPr lang="en-US"/>
               <a:t>Third level</a:t>
             </a:r>
-            <a:endParaRPr lang="en-US"/>
           </a:p>
           <a:p>
             <a:pPr lvl="3"/>
@@ -739,7 +734,6 @@
               <a:rPr lang="en-US"/>
               <a:t>Fourth level</a:t>
             </a:r>
-            <a:endParaRPr lang="en-US"/>
           </a:p>
           <a:p>
             <a:pPr lvl="4"/>
@@ -768,6 +762,7 @@
           <a:p>
             <a:fld id="{32DA9CA3-1682-4D49-BD84-33DE32D3C0F7}" type="datetimeFigureOut">
               <a:rPr lang="en-US" smtClean="0"/>
+              <a:t>8/17/23</a:t>
             </a:fld>
             <a:endParaRPr lang="en-US"/>
           </a:p>
@@ -809,6 +804,7 @@
           <a:p>
             <a:fld id="{56040734-3020-B24F-9D43-20822771C920}" type="slidenum">
               <a:rPr lang="en-US" smtClean="0"/>
+              <a:t>‹#›</a:t>
             </a:fld>
             <a:endParaRPr lang="en-US"/>
           </a:p>
@@ -987,7 +983,6 @@
               <a:rPr lang="en-US"/>
               <a:t>Click to edit Master text styles</a:t>
             </a:r>
-            <a:endParaRPr lang="en-US"/>
           </a:p>
         </p:txBody>
       </p:sp>
@@ -1008,6 +1003,7 @@
           <a:p>
             <a:fld id="{32DA9CA3-1682-4D49-BD84-33DE32D3C0F7}" type="datetimeFigureOut">
               <a:rPr lang="en-US" smtClean="0"/>
+              <a:t>8/17/23</a:t>
             </a:fld>
             <a:endParaRPr lang="en-US"/>
           </a:p>
@@ -1049,6 +1045,7 @@
           <a:p>
             <a:fld id="{56040734-3020-B24F-9D43-20822771C920}" type="slidenum">
               <a:rPr lang="en-US" smtClean="0"/>
+              <a:t>‹#›</a:t>
             </a:fld>
             <a:endParaRPr lang="en-US"/>
           </a:p>
@@ -1127,7 +1124,6 @@
               <a:rPr lang="en-US"/>
               <a:t>Click to edit Master text styles</a:t>
             </a:r>
-            <a:endParaRPr lang="en-US"/>
           </a:p>
           <a:p>
             <a:pPr lvl="1"/>
@@ -1135,7 +1131,6 @@
               <a:rPr lang="en-US"/>
               <a:t>Second level</a:t>
             </a:r>
-            <a:endParaRPr lang="en-US"/>
           </a:p>
           <a:p>
             <a:pPr lvl="2"/>
@@ -1143,7 +1138,6 @@
               <a:rPr lang="en-US"/>
               <a:t>Third level</a:t>
             </a:r>
-            <a:endParaRPr lang="en-US"/>
           </a:p>
           <a:p>
             <a:pPr lvl="3"/>
@@ -1151,7 +1145,6 @@
               <a:rPr lang="en-US"/>
               <a:t>Fourth level</a:t>
             </a:r>
-            <a:endParaRPr lang="en-US"/>
           </a:p>
           <a:p>
             <a:pPr lvl="4"/>
@@ -1188,7 +1181,6 @@
               <a:rPr lang="en-US"/>
               <a:t>Click to edit Master text styles</a:t>
             </a:r>
-            <a:endParaRPr lang="en-US"/>
           </a:p>
           <a:p>
             <a:pPr lvl="1"/>
@@ -1196,7 +1188,6 @@
               <a:rPr lang="en-US"/>
               <a:t>Second level</a:t>
             </a:r>
-            <a:endParaRPr lang="en-US"/>
           </a:p>
           <a:p>
             <a:pPr lvl="2"/>
@@ -1204,7 +1195,6 @@
               <a:rPr lang="en-US"/>
               <a:t>Third level</a:t>
             </a:r>
-            <a:endParaRPr lang="en-US"/>
           </a:p>
           <a:p>
             <a:pPr lvl="3"/>
@@ -1212,7 +1202,6 @@
               <a:rPr lang="en-US"/>
               <a:t>Fourth level</a:t>
             </a:r>
-            <a:endParaRPr lang="en-US"/>
           </a:p>
           <a:p>
             <a:pPr lvl="4"/>
@@ -1241,6 +1230,7 @@
           <a:p>
             <a:fld id="{32DA9CA3-1682-4D49-BD84-33DE32D3C0F7}" type="datetimeFigureOut">
               <a:rPr lang="en-US" smtClean="0"/>
+              <a:t>8/17/23</a:t>
             </a:fld>
             <a:endParaRPr lang="en-US"/>
           </a:p>
@@ -1282,6 +1272,7 @@
           <a:p>
             <a:fld id="{56040734-3020-B24F-9D43-20822771C920}" type="slidenum">
               <a:rPr lang="en-US" smtClean="0"/>
+              <a:t>‹#›</a:t>
             </a:fld>
             <a:endParaRPr lang="en-US"/>
           </a:p>
@@ -1402,7 +1393,6 @@
               <a:rPr lang="en-US"/>
               <a:t>Click to edit Master text styles</a:t>
             </a:r>
-            <a:endParaRPr lang="en-US"/>
           </a:p>
         </p:txBody>
       </p:sp>
@@ -1431,7 +1421,6 @@
               <a:rPr lang="en-US"/>
               <a:t>Click to edit Master text styles</a:t>
             </a:r>
-            <a:endParaRPr lang="en-US"/>
           </a:p>
           <a:p>
             <a:pPr lvl="1"/>
@@ -1439,7 +1428,6 @@
               <a:rPr lang="en-US"/>
               <a:t>Second level</a:t>
             </a:r>
-            <a:endParaRPr lang="en-US"/>
           </a:p>
           <a:p>
             <a:pPr lvl="2"/>
@@ -1447,7 +1435,6 @@
               <a:rPr lang="en-US"/>
               <a:t>Third level</a:t>
             </a:r>
-            <a:endParaRPr lang="en-US"/>
           </a:p>
           <a:p>
             <a:pPr lvl="3"/>
@@ -1455,7 +1442,6 @@
               <a:rPr lang="en-US"/>
               <a:t>Fourth level</a:t>
             </a:r>
-            <a:endParaRPr lang="en-US"/>
           </a:p>
           <a:p>
             <a:pPr lvl="4"/>
@@ -1529,7 +1515,6 @@
               <a:rPr lang="en-US"/>
               <a:t>Click to edit Master text styles</a:t>
             </a:r>
-            <a:endParaRPr lang="en-US"/>
           </a:p>
         </p:txBody>
       </p:sp>
@@ -1558,7 +1543,6 @@
               <a:rPr lang="en-US"/>
               <a:t>Click to edit Master text styles</a:t>
             </a:r>
-            <a:endParaRPr lang="en-US"/>
           </a:p>
           <a:p>
             <a:pPr lvl="1"/>
@@ -1566,7 +1550,6 @@
               <a:rPr lang="en-US"/>
               <a:t>Second level</a:t>
             </a:r>
-            <a:endParaRPr lang="en-US"/>
           </a:p>
           <a:p>
             <a:pPr lvl="2"/>
@@ -1574,7 +1557,6 @@
               <a:rPr lang="en-US"/>
               <a:t>Third level</a:t>
             </a:r>
-            <a:endParaRPr lang="en-US"/>
           </a:p>
           <a:p>
             <a:pPr lvl="3"/>
@@ -1582,7 +1564,6 @@
               <a:rPr lang="en-US"/>
               <a:t>Fourth level</a:t>
             </a:r>
-            <a:endParaRPr lang="en-US"/>
           </a:p>
           <a:p>
             <a:pPr lvl="4"/>
@@ -1611,6 +1592,7 @@
           <a:p>
             <a:fld id="{32DA9CA3-1682-4D49-BD84-33DE32D3C0F7}" type="datetimeFigureOut">
               <a:rPr lang="en-US" smtClean="0"/>
+              <a:t>8/17/23</a:t>
             </a:fld>
             <a:endParaRPr lang="en-US"/>
           </a:p>
@@ -1652,6 +1634,7 @@
           <a:p>
             <a:fld id="{56040734-3020-B24F-9D43-20822771C920}" type="slidenum">
               <a:rPr lang="en-US" smtClean="0"/>
+              <a:t>‹#›</a:t>
             </a:fld>
             <a:endParaRPr lang="en-US"/>
           </a:p>
@@ -1722,6 +1705,7 @@
           <a:p>
             <a:fld id="{32DA9CA3-1682-4D49-BD84-33DE32D3C0F7}" type="datetimeFigureOut">
               <a:rPr lang="en-US" smtClean="0"/>
+              <a:t>8/17/23</a:t>
             </a:fld>
             <a:endParaRPr lang="en-US"/>
           </a:p>
@@ -1763,6 +1747,7 @@
           <a:p>
             <a:fld id="{56040734-3020-B24F-9D43-20822771C920}" type="slidenum">
               <a:rPr lang="en-US" smtClean="0"/>
+              <a:t>‹#›</a:t>
             </a:fld>
             <a:endParaRPr lang="en-US"/>
           </a:p>
@@ -1810,6 +1795,7 @@
           <a:p>
             <a:fld id="{32DA9CA3-1682-4D49-BD84-33DE32D3C0F7}" type="datetimeFigureOut">
               <a:rPr lang="en-US" smtClean="0"/>
+              <a:t>8/17/23</a:t>
             </a:fld>
             <a:endParaRPr lang="en-US"/>
           </a:p>
@@ -1851,6 +1837,7 @@
           <a:p>
             <a:fld id="{56040734-3020-B24F-9D43-20822771C920}" type="slidenum">
               <a:rPr lang="en-US" smtClean="0"/>
+              <a:t>‹#›</a:t>
             </a:fld>
             <a:endParaRPr lang="en-US"/>
           </a:p>
@@ -1966,7 +1953,6 @@
               <a:rPr lang="en-US"/>
               <a:t>Click to edit Master text styles</a:t>
             </a:r>
-            <a:endParaRPr lang="en-US"/>
           </a:p>
           <a:p>
             <a:pPr lvl="1"/>
@@ -1974,7 +1960,6 @@
               <a:rPr lang="en-US"/>
               <a:t>Second level</a:t>
             </a:r>
-            <a:endParaRPr lang="en-US"/>
           </a:p>
           <a:p>
             <a:pPr lvl="2"/>
@@ -1982,7 +1967,6 @@
               <a:rPr lang="en-US"/>
               <a:t>Third level</a:t>
             </a:r>
-            <a:endParaRPr lang="en-US"/>
           </a:p>
           <a:p>
             <a:pPr lvl="3"/>
@@ -1990,7 +1974,6 @@
               <a:rPr lang="en-US"/>
               <a:t>Fourth level</a:t>
             </a:r>
-            <a:endParaRPr lang="en-US"/>
           </a:p>
           <a:p>
             <a:pPr lvl="4"/>
@@ -2064,7 +2047,6 @@
               <a:rPr lang="en-US"/>
               <a:t>Click to edit Master text styles</a:t>
             </a:r>
-            <a:endParaRPr lang="en-US"/>
           </a:p>
         </p:txBody>
       </p:sp>
@@ -2085,6 +2067,7 @@
           <a:p>
             <a:fld id="{32DA9CA3-1682-4D49-BD84-33DE32D3C0F7}" type="datetimeFigureOut">
               <a:rPr lang="en-US" smtClean="0"/>
+              <a:t>8/17/23</a:t>
             </a:fld>
             <a:endParaRPr lang="en-US"/>
           </a:p>
@@ -2126,6 +2109,7 @@
           <a:p>
             <a:fld id="{56040734-3020-B24F-9D43-20822771C920}" type="slidenum">
               <a:rPr lang="en-US" smtClean="0"/>
+              <a:t>‹#›</a:t>
             </a:fld>
             <a:endParaRPr lang="en-US"/>
           </a:p>
@@ -2315,7 +2299,6 @@
               <a:rPr lang="en-US"/>
               <a:t>Click to edit Master text styles</a:t>
             </a:r>
-            <a:endParaRPr lang="en-US"/>
           </a:p>
         </p:txBody>
       </p:sp>
@@ -2336,6 +2319,7 @@
           <a:p>
             <a:fld id="{32DA9CA3-1682-4D49-BD84-33DE32D3C0F7}" type="datetimeFigureOut">
               <a:rPr lang="en-US" smtClean="0"/>
+              <a:t>8/17/23</a:t>
             </a:fld>
             <a:endParaRPr lang="en-US"/>
           </a:p>
@@ -2377,6 +2361,7 @@
           <a:p>
             <a:fld id="{56040734-3020-B24F-9D43-20822771C920}" type="slidenum">
               <a:rPr lang="en-US" smtClean="0"/>
+              <a:t>‹#›</a:t>
             </a:fld>
             <a:endParaRPr lang="en-US"/>
           </a:p>
@@ -2475,7 +2460,6 @@
               <a:rPr lang="en-US"/>
               <a:t>Click to edit Master text styles</a:t>
             </a:r>
-            <a:endParaRPr lang="en-US"/>
           </a:p>
           <a:p>
             <a:pPr lvl="1"/>
@@ -2483,7 +2467,6 @@
               <a:rPr lang="en-US"/>
               <a:t>Second level</a:t>
             </a:r>
-            <a:endParaRPr lang="en-US"/>
           </a:p>
           <a:p>
             <a:pPr lvl="2"/>
@@ -2491,7 +2474,6 @@
               <a:rPr lang="en-US"/>
               <a:t>Third level</a:t>
             </a:r>
-            <a:endParaRPr lang="en-US"/>
           </a:p>
           <a:p>
             <a:pPr lvl="3"/>
@@ -2499,7 +2481,6 @@
               <a:rPr lang="en-US"/>
               <a:t>Fourth level</a:t>
             </a:r>
-            <a:endParaRPr lang="en-US"/>
           </a:p>
           <a:p>
             <a:pPr lvl="4"/>
@@ -2546,6 +2527,7 @@
           <a:p>
             <a:fld id="{32DA9CA3-1682-4D49-BD84-33DE32D3C0F7}" type="datetimeFigureOut">
               <a:rPr lang="en-US" smtClean="0"/>
+              <a:t>8/17/23</a:t>
             </a:fld>
             <a:endParaRPr lang="en-US"/>
           </a:p>
@@ -2623,6 +2605,7 @@
           <a:p>
             <a:fld id="{56040734-3020-B24F-9D43-20822771C920}" type="slidenum">
               <a:rPr lang="en-US" smtClean="0"/>
+              <a:t>‹#›</a:t>
             </a:fld>
             <a:endParaRPr lang="en-US"/>
           </a:p>
@@ -2997,7 +2980,7 @@
           <p:nvPr/>
         </p:nvPicPr>
         <p:blipFill rotWithShape="1">
-          <a:blip r:embed="rId1"/>
+          <a:blip r:embed="rId4"/>
           <a:srcRect l="1953" t="10515" r="1200" b="38203"/>
           <a:stretch>
             <a:fillRect/>
@@ -3033,19 +3016,30 @@
           <a:bodyPr wrap="square" rtlCol="0">
             <a:spAutoFit/>
           </a:bodyPr>
-          <a:p>
-            <a:r>
-              <a:rPr lang="en-US" altLang="zh-CN" sz="1200">
+          <a:lstStyle/>
+          <a:p>
+            <a:r>
+              <a:rPr lang="en-US" altLang="zh-CN" sz="1200" dirty="0" err="1">
                 <a:solidFill>
                   <a:schemeClr val="bg1"/>
                 </a:solidFill>
                 <a:latin typeface="Times New Roman" panose="02020603050405020304" charset="0"/>
                 <a:cs typeface="Times New Roman" panose="02020603050405020304" charset="0"/>
               </a:rPr>
-              <a:t>kyon:「What should I do since all the clubs at school are so boring?</a:t>
-            </a:r>
-            <a:r>
-              <a:rPr lang="en-US" altLang="zh-CN" sz="1200">
+              <a:t>Kyon</a:t>
+            </a:r>
+            <a:r>
+              <a:rPr lang="en-US" altLang="zh-CN" sz="1200" dirty="0">
+                <a:solidFill>
+                  <a:schemeClr val="bg1"/>
+                </a:solidFill>
+                <a:latin typeface="Times New Roman" panose="02020603050405020304" charset="0"/>
+                <a:cs typeface="Times New Roman" panose="02020603050405020304" charset="0"/>
+              </a:rPr>
+              <a:t>:「What should I do since all the clubs at school are so boring?</a:t>
+            </a:r>
+            <a:r>
+              <a:rPr lang="en-US" altLang="zh-CN" sz="1200" dirty="0">
                 <a:solidFill>
                   <a:schemeClr val="bg1"/>
                 </a:solidFill>
@@ -3055,7 +3049,7 @@
               </a:rPr>
               <a:t>」</a:t>
             </a:r>
-            <a:endParaRPr lang="en-US" altLang="zh-CN" sz="1200">
+            <a:endParaRPr lang="en-US" altLang="zh-CN" sz="1200" dirty="0">
               <a:solidFill>
                 <a:schemeClr val="bg1"/>
               </a:solidFill>
@@ -3085,19 +3079,30 @@
           <a:bodyPr wrap="square" rtlCol="0">
             <a:noAutofit/>
           </a:bodyPr>
-          <a:p>
-            <a:r>
-              <a:rPr lang="en-US" altLang="zh-CN" sz="1200">
+          <a:lstStyle/>
+          <a:p>
+            <a:r>
+              <a:rPr lang="en-US" altLang="zh-CN" sz="1200" dirty="0" err="1">
                 <a:solidFill>
                   <a:schemeClr val="bg1"/>
                 </a:solidFill>
                 <a:latin typeface="Times New Roman" panose="02020603050405020304" charset="0"/>
                 <a:cs typeface="Times New Roman" panose="02020603050405020304" charset="0"/>
               </a:rPr>
-              <a:t>haruhi:</a:t>
-            </a:r>
-            <a:r>
-              <a:rPr lang="en-US" altLang="zh-CN" sz="1200">
+              <a:t>Haruhi</a:t>
+            </a:r>
+            <a:r>
+              <a:rPr lang="en-US" altLang="zh-CN" sz="1200" dirty="0">
+                <a:solidFill>
+                  <a:schemeClr val="bg1"/>
+                </a:solidFill>
+                <a:latin typeface="Times New Roman" panose="02020603050405020304" charset="0"/>
+                <a:cs typeface="Times New Roman" panose="02020603050405020304" charset="0"/>
+              </a:rPr>
+              <a:t>:</a:t>
+            </a:r>
+            <a:r>
+              <a:rPr lang="en-US" altLang="zh-CN" sz="1200" dirty="0">
                 <a:solidFill>
                   <a:schemeClr val="bg1"/>
                 </a:solidFill>
@@ -3107,7 +3112,7 @@
               </a:rPr>
               <a:t>「You're right, these clubs are too ordinary and lack creativity and uniqueness.」</a:t>
             </a:r>
-            <a:endParaRPr lang="en-US" altLang="zh-CN" sz="1200">
+            <a:endParaRPr lang="en-US" altLang="zh-CN" sz="1200" dirty="0">
               <a:solidFill>
                 <a:schemeClr val="bg1"/>
               </a:solidFill>
@@ -3116,7 +3121,7 @@
             </a:endParaRPr>
           </a:p>
           <a:p>
-            <a:endParaRPr lang="en-US" altLang="zh-CN" sz="1200">
+            <a:endParaRPr lang="en-US" altLang="zh-CN" sz="1200" dirty="0">
               <a:solidFill>
                 <a:schemeClr val="bg1"/>
               </a:solidFill>
@@ -3132,7 +3137,7 @@
           <p:cNvSpPr txBox="1"/>
           <p:nvPr>
             <p:custDataLst>
-              <p:tags r:id="rId2"/>
+              <p:tags r:id="rId1"/>
             </p:custDataLst>
           </p:nvPr>
         </p:nvSpPr>
@@ -3150,19 +3155,30 @@
           <a:bodyPr wrap="square" rtlCol="0">
             <a:noAutofit/>
           </a:bodyPr>
-          <a:p>
-            <a:r>
-              <a:rPr lang="en-US" altLang="zh-CN" sz="1200">
+          <a:lstStyle/>
+          <a:p>
+            <a:r>
+              <a:rPr lang="en-US" altLang="zh-CN" sz="1200" dirty="0" err="1">
                 <a:solidFill>
                   <a:schemeClr val="bg1"/>
                 </a:solidFill>
                 <a:latin typeface="Times New Roman" panose="02020603050405020304" charset="0"/>
                 <a:cs typeface="Times New Roman" panose="02020603050405020304" charset="0"/>
               </a:rPr>
-              <a:t>kyon:</a:t>
-            </a:r>
-            <a:r>
-              <a:rPr lang="en-US" altLang="zh-CN" sz="1200">
+              <a:t>Kyon</a:t>
+            </a:r>
+            <a:r>
+              <a:rPr lang="en-US" altLang="zh-CN" sz="1200" dirty="0">
+                <a:solidFill>
+                  <a:schemeClr val="bg1"/>
+                </a:solidFill>
+                <a:latin typeface="Times New Roman" panose="02020603050405020304" charset="0"/>
+                <a:cs typeface="Times New Roman" panose="02020603050405020304" charset="0"/>
+              </a:rPr>
+              <a:t>:</a:t>
+            </a:r>
+            <a:r>
+              <a:rPr lang="en-US" altLang="zh-CN" sz="1200" dirty="0">
                 <a:solidFill>
                   <a:schemeClr val="bg1"/>
                 </a:solidFill>
@@ -3172,7 +3188,7 @@
               </a:rPr>
               <a:t>「If we form a club, what should we name it?」</a:t>
             </a:r>
-            <a:endParaRPr lang="en-US" altLang="zh-CN" sz="1200">
+            <a:endParaRPr lang="en-US" altLang="zh-CN" sz="1200" dirty="0">
               <a:solidFill>
                 <a:schemeClr val="bg1"/>
               </a:solidFill>
@@ -3181,7 +3197,7 @@
             </a:endParaRPr>
           </a:p>
           <a:p>
-            <a:endParaRPr lang="en-US" altLang="zh-CN" sz="1200">
+            <a:endParaRPr lang="en-US" altLang="zh-CN" sz="1200" dirty="0">
               <a:solidFill>
                 <a:schemeClr val="bg1"/>
               </a:solidFill>
@@ -3197,13 +3213,13 @@
           <p:cNvSpPr txBox="1"/>
           <p:nvPr>
             <p:custDataLst>
-              <p:tags r:id="rId3"/>
+              <p:tags r:id="rId2"/>
             </p:custDataLst>
           </p:nvPr>
         </p:nvSpPr>
         <p:spPr>
           <a:xfrm>
-            <a:off x="-67945" y="3188970"/>
+            <a:off x="82884" y="3174047"/>
             <a:ext cx="10855325" cy="551815"/>
           </a:xfrm>
           <a:prstGeom prst="rect">
@@ -3215,19 +3231,40 @@
           <a:bodyPr wrap="square" rtlCol="0">
             <a:noAutofit/>
           </a:bodyPr>
-          <a:p>
-            <a:r>
-              <a:rPr lang="en-US" altLang="zh-CN" sz="1200">
+          <a:lstStyle/>
+          <a:p>
+            <a:r>
+              <a:rPr lang="en-US" altLang="zh-CN" sz="1200" dirty="0">
                 <a:solidFill>
                   <a:schemeClr val="bg1"/>
                 </a:solidFill>
                 <a:latin typeface="Times New Roman" panose="02020603050405020304" charset="0"/>
                 <a:cs typeface="Times New Roman" panose="02020603050405020304" charset="0"/>
               </a:rPr>
-              <a:t>                                           haruhi:</a:t>
-            </a:r>
-            <a:r>
-              <a:rPr lang="en-US" altLang="zh-CN" sz="1200">
+              <a:t>                                          </a:t>
+            </a:r>
+            <a:r>
+              <a:rPr lang="en-US" altLang="zh-CN" sz="1200" dirty="0" err="1">
+                <a:solidFill>
+                  <a:schemeClr val="bg1"/>
+                </a:solidFill>
+                <a:latin typeface="Times New Roman" panose="02020603050405020304" charset="0"/>
+                <a:cs typeface="Times New Roman" panose="02020603050405020304" charset="0"/>
+              </a:rPr>
+              <a:t>Haruhi</a:t>
+            </a:r>
+            <a:r>
+              <a:rPr lang="en-US" altLang="zh-CN" sz="1200" dirty="0">
+                <a:solidFill>
+                  <a:schemeClr val="bg1"/>
+                </a:solidFill>
+                <a:latin typeface="Times New Roman" panose="02020603050405020304" charset="0"/>
+                <a:cs typeface="Times New Roman" panose="02020603050405020304" charset="0"/>
+              </a:rPr>
+              <a:t>:</a:t>
+            </a:r>
+            <a:r>
+              <a:rPr lang="en-US" altLang="zh-CN" sz="1200" dirty="0">
                 <a:solidFill>
                   <a:schemeClr val="bg1"/>
                 </a:solidFill>
@@ -3237,18 +3274,10 @@
               </a:rPr>
               <a:t>「I've already decided on a name for the club - the Save the </a:t>
             </a:r>
-            <a:endParaRPr lang="en-US" altLang="zh-CN" sz="1200">
-              <a:solidFill>
-                <a:schemeClr val="bg1"/>
-              </a:solidFill>
-              <a:latin typeface="Times New Roman" panose="02020603050405020304" charset="0"/>
-              <a:cs typeface="Times New Roman" panose="02020603050405020304" charset="0"/>
-              <a:sym typeface="+mn-ea"/>
-            </a:endParaRPr>
-          </a:p>
-          <a:p>
-            <a:r>
-              <a:rPr lang="en-US" altLang="zh-CN" sz="1200">
+          </a:p>
+          <a:p>
+            <a:r>
+              <a:rPr lang="en-US" altLang="zh-CN" sz="1200" dirty="0">
                 <a:solidFill>
                   <a:schemeClr val="bg1"/>
                 </a:solidFill>
@@ -3256,9 +3285,53 @@
                 <a:cs typeface="Times New Roman" panose="02020603050405020304" charset="0"/>
                 <a:sym typeface="+mn-ea"/>
               </a:rPr>
-              <a:t>   World by Overloading it with Fun Haruhi Suzumiya Brigade, also known as the SOS Brigade.」</a:t>
-            </a:r>
-            <a:endParaRPr lang="en-US" altLang="zh-CN" sz="1200">
+              <a:t>   World by Overloading it with Fun </a:t>
+            </a:r>
+            <a:r>
+              <a:rPr lang="en-US" altLang="zh-CN" sz="1200" dirty="0" err="1">
+                <a:solidFill>
+                  <a:schemeClr val="bg1"/>
+                </a:solidFill>
+                <a:latin typeface="Times New Roman" panose="02020603050405020304" charset="0"/>
+                <a:cs typeface="Times New Roman" panose="02020603050405020304" charset="0"/>
+                <a:sym typeface="+mn-ea"/>
+              </a:rPr>
+              <a:t>Haruhi</a:t>
+            </a:r>
+            <a:r>
+              <a:rPr lang="en-US" altLang="zh-CN" sz="1200" dirty="0">
+                <a:solidFill>
+                  <a:schemeClr val="bg1"/>
+                </a:solidFill>
+                <a:latin typeface="Times New Roman" panose="02020603050405020304" charset="0"/>
+                <a:cs typeface="Times New Roman" panose="02020603050405020304" charset="0"/>
+                <a:sym typeface="+mn-ea"/>
+              </a:rPr>
+              <a:t> </a:t>
+            </a:r>
+            <a:r>
+              <a:rPr lang="en-US" altLang="zh-CN" sz="1200" dirty="0" err="1">
+                <a:solidFill>
+                  <a:schemeClr val="bg1"/>
+                </a:solidFill>
+                <a:latin typeface="Times New Roman" panose="02020603050405020304" charset="0"/>
+                <a:cs typeface="Times New Roman" panose="02020603050405020304" charset="0"/>
+                <a:sym typeface="+mn-ea"/>
+              </a:rPr>
+              <a:t>Suzumiya</a:t>
+            </a:r>
+            <a:r>
+              <a:rPr lang="en-US" altLang="zh-CN" sz="1200" dirty="0">
+                <a:solidFill>
+                  <a:schemeClr val="bg1"/>
+                </a:solidFill>
+                <a:latin typeface="Times New Roman" panose="02020603050405020304" charset="0"/>
+                <a:cs typeface="Times New Roman" panose="02020603050405020304" charset="0"/>
+                <a:sym typeface="+mn-ea"/>
+              </a:rPr>
+              <a:t> Brigade, also known as the SOS Brigade.」</a:t>
+            </a:r>
+            <a:endParaRPr lang="en-US" altLang="zh-CN" sz="1200" dirty="0">
               <a:solidFill>
                 <a:schemeClr val="bg1"/>
               </a:solidFill>
@@ -3267,7 +3340,7 @@
             </a:endParaRPr>
           </a:p>
           <a:p>
-            <a:endParaRPr lang="en-US" altLang="zh-CN" sz="1200">
+            <a:endParaRPr lang="en-US" altLang="zh-CN" sz="1200" dirty="0">
               <a:solidFill>
                 <a:schemeClr val="bg1"/>
               </a:solidFill>
@@ -3286,21 +3359,21 @@
 </file>
 
 <file path=ppt/tags/tag1.xml><?xml version="1.0" encoding="utf-8"?>
-<p:tagLst xmlns:p="http://schemas.openxmlformats.org/presentationml/2006/main">
-  <p:tag name="KSO_WM_BEAUTIFY_FLAG" val=""/>
+<p:tagLst xmlns:a="http://schemas.openxmlformats.org/drawingml/2006/main" xmlns:r="http://schemas.openxmlformats.org/officeDocument/2006/relationships" xmlns:p="http://schemas.openxmlformats.org/presentationml/2006/main">
+  <p:tag name="COMMONDATA" val="eyJoZGlkIjoiNTM2ZGM2ODEzNThhODVhMjJiMDNlNGE1MWUyNWZhMDkifQ=="/>
+  <p:tag name="KSO_WPP_MARK_KEY" val="ca83fd51-a883-490a-b357-eafb75b57302"/>
 </p:tagLst>
 </file>
 
 <file path=ppt/tags/tag2.xml><?xml version="1.0" encoding="utf-8"?>
-<p:tagLst xmlns:p="http://schemas.openxmlformats.org/presentationml/2006/main">
+<p:tagLst xmlns:a="http://schemas.openxmlformats.org/drawingml/2006/main" xmlns:r="http://schemas.openxmlformats.org/officeDocument/2006/relationships" xmlns:p="http://schemas.openxmlformats.org/presentationml/2006/main">
   <p:tag name="KSO_WM_BEAUTIFY_FLAG" val=""/>
 </p:tagLst>
 </file>
 
 <file path=ppt/tags/tag3.xml><?xml version="1.0" encoding="utf-8"?>
-<p:tagLst xmlns:p="http://schemas.openxmlformats.org/presentationml/2006/main">
-  <p:tag name="COMMONDATA" val="eyJoZGlkIjoiNTM2ZGM2ODEzNThhODVhMjJiMDNlNGE1MWUyNWZhMDkifQ=="/>
-  <p:tag name="KSO_WPP_MARK_KEY" val="ca83fd51-a883-490a-b357-eafb75b57302"/>
+<p:tagLst xmlns:a="http://schemas.openxmlformats.org/drawingml/2006/main" xmlns:r="http://schemas.openxmlformats.org/officeDocument/2006/relationships" xmlns:p="http://schemas.openxmlformats.org/presentationml/2006/main">
+  <p:tag name="KSO_WM_BEAUTIFY_FLAG" val=""/>
 </p:tagLst>
 </file>
 
@@ -3555,6 +3628,8 @@
       </a:bgFillStyleLst>
     </a:fmtScheme>
   </a:themeElements>
+  <a:objectDefaults/>
+  <a:extraClrSchemeLst/>
   <a:extLst>
     <a:ext uri="{05A4C25C-085E-4340-85A3-A5531E510DB2}">
       <thm15:themeFamily xmlns:thm15="http://schemas.microsoft.com/office/thememl/2012/main" name="Office Theme" id="{62F939B6-93AF-4DB8-9C6B-D6C7DFDC589F}" vid="{4A3C46E8-61CC-4603-A589-7422A47A8E4A}"/>

</xml_diff>